<commit_message>
add pyvista.yml for conda environment setup
</commit_message>
<xml_diff>
--- a/doc/pyvista.pptx
+++ b/doc/pyvista.pptx
@@ -117,6 +117,11 @@
       </a:defRPr>
     </a:lvl9pPr>
   </p:defaultTextStyle>
+  <p:extLst>
+    <p:ext uri="{EFAFB233-063F-42B5-8137-9DF3F51BA10A}">
+      <p15:sldGuideLst xmlns:p15="http://schemas.microsoft.com/office/powerpoint/2012/main"/>
+    </p:ext>
+  </p:extLst>
 </p:presentation>
 </file>
 
@@ -267,7 +272,7 @@
           <a:p>
             <a:fld id="{E86A0985-66C3-1246-B0F3-45EE10F6E1B6}" type="datetimeFigureOut">
               <a:rPr lang="en-US" smtClean="0"/>
-              <a:t>2/7/20</a:t>
+              <a:t>3/7/23</a:t>
             </a:fld>
             <a:endParaRPr lang="en-US"/>
           </a:p>
@@ -465,7 +470,7 @@
           <a:p>
             <a:fld id="{E86A0985-66C3-1246-B0F3-45EE10F6E1B6}" type="datetimeFigureOut">
               <a:rPr lang="en-US" smtClean="0"/>
-              <a:t>2/7/20</a:t>
+              <a:t>3/7/23</a:t>
             </a:fld>
             <a:endParaRPr lang="en-US"/>
           </a:p>
@@ -673,7 +678,7 @@
           <a:p>
             <a:fld id="{E86A0985-66C3-1246-B0F3-45EE10F6E1B6}" type="datetimeFigureOut">
               <a:rPr lang="en-US" smtClean="0"/>
-              <a:t>2/7/20</a:t>
+              <a:t>3/7/23</a:t>
             </a:fld>
             <a:endParaRPr lang="en-US"/>
           </a:p>
@@ -871,7 +876,7 @@
           <a:p>
             <a:fld id="{E86A0985-66C3-1246-B0F3-45EE10F6E1B6}" type="datetimeFigureOut">
               <a:rPr lang="en-US" smtClean="0"/>
-              <a:t>2/7/20</a:t>
+              <a:t>3/7/23</a:t>
             </a:fld>
             <a:endParaRPr lang="en-US"/>
           </a:p>
@@ -1146,7 +1151,7 @@
           <a:p>
             <a:fld id="{E86A0985-66C3-1246-B0F3-45EE10F6E1B6}" type="datetimeFigureOut">
               <a:rPr lang="en-US" smtClean="0"/>
-              <a:t>2/7/20</a:t>
+              <a:t>3/7/23</a:t>
             </a:fld>
             <a:endParaRPr lang="en-US"/>
           </a:p>
@@ -1411,7 +1416,7 @@
           <a:p>
             <a:fld id="{E86A0985-66C3-1246-B0F3-45EE10F6E1B6}" type="datetimeFigureOut">
               <a:rPr lang="en-US" smtClean="0"/>
-              <a:t>2/7/20</a:t>
+              <a:t>3/7/23</a:t>
             </a:fld>
             <a:endParaRPr lang="en-US"/>
           </a:p>
@@ -1823,7 +1828,7 @@
           <a:p>
             <a:fld id="{E86A0985-66C3-1246-B0F3-45EE10F6E1B6}" type="datetimeFigureOut">
               <a:rPr lang="en-US" smtClean="0"/>
-              <a:t>2/7/20</a:t>
+              <a:t>3/7/23</a:t>
             </a:fld>
             <a:endParaRPr lang="en-US"/>
           </a:p>
@@ -1964,7 +1969,7 @@
           <a:p>
             <a:fld id="{E86A0985-66C3-1246-B0F3-45EE10F6E1B6}" type="datetimeFigureOut">
               <a:rPr lang="en-US" smtClean="0"/>
-              <a:t>2/7/20</a:t>
+              <a:t>3/7/23</a:t>
             </a:fld>
             <a:endParaRPr lang="en-US"/>
           </a:p>
@@ -2077,7 +2082,7 @@
           <a:p>
             <a:fld id="{E86A0985-66C3-1246-B0F3-45EE10F6E1B6}" type="datetimeFigureOut">
               <a:rPr lang="en-US" smtClean="0"/>
-              <a:t>2/7/20</a:t>
+              <a:t>3/7/23</a:t>
             </a:fld>
             <a:endParaRPr lang="en-US"/>
           </a:p>
@@ -2388,7 +2393,7 @@
           <a:p>
             <a:fld id="{E86A0985-66C3-1246-B0F3-45EE10F6E1B6}" type="datetimeFigureOut">
               <a:rPr lang="en-US" smtClean="0"/>
-              <a:t>2/7/20</a:t>
+              <a:t>3/7/23</a:t>
             </a:fld>
             <a:endParaRPr lang="en-US"/>
           </a:p>
@@ -2676,7 +2681,7 @@
           <a:p>
             <a:fld id="{E86A0985-66C3-1246-B0F3-45EE10F6E1B6}" type="datetimeFigureOut">
               <a:rPr lang="en-US" smtClean="0"/>
-              <a:t>2/7/20</a:t>
+              <a:t>3/7/23</a:t>
             </a:fld>
             <a:endParaRPr lang="en-US"/>
           </a:p>
@@ -2917,7 +2922,7 @@
           <a:p>
             <a:fld id="{E86A0985-66C3-1246-B0F3-45EE10F6E1B6}" type="datetimeFigureOut">
               <a:rPr lang="en-US" smtClean="0"/>
-              <a:t>2/7/20</a:t>
+              <a:t>3/7/23</a:t>
             </a:fld>
             <a:endParaRPr lang="en-US"/>
           </a:p>
@@ -4652,7 +4657,7 @@
               <a:t> </a:t>
             </a:r>
             <a:r>
-              <a:rPr lang="en-US" dirty="0" err="1">
+              <a:rPr lang="en-US" dirty="0">
                 <a:hlinkClick r:id="rId2"/>
               </a:rPr>
               <a:t>NDData</a:t>
@@ -4663,11 +4668,11 @@
             </a:r>
             <a:r>
               <a:rPr lang="en-US" dirty="0" err="1"/>
-              <a:t>CCDData</a:t>
-            </a:r>
-            <a:r>
-              <a:rPr lang="en-US" dirty="0"/>
-              <a:t> objects</a:t>
+              <a:t>pyvista</a:t>
+            </a:r>
+            <a:r>
+              <a:rPr lang="en-US" dirty="0"/>
+              <a:t> Data object</a:t>
             </a:r>
           </a:p>
         </p:txBody>
@@ -4704,15 +4709,7 @@
             </a:pPr>
             <a:r>
               <a:rPr lang="en-US" dirty="0"/>
-              <a:t>     a=</a:t>
-            </a:r>
-            <a:r>
-              <a:rPr lang="en-US" dirty="0" err="1"/>
-              <a:t>CCDData</a:t>
-            </a:r>
-            <a:r>
-              <a:rPr lang="en-US" dirty="0"/>
-              <a:t>(…)</a:t>
+              <a:t>     a=Data(…)</a:t>
             </a:r>
           </a:p>
           <a:p>
@@ -4744,33 +4741,6 @@
               <a:t>a.mask</a:t>
             </a:r>
             <a:endParaRPr lang="en-US" dirty="0"/>
-          </a:p>
-          <a:p>
-            <a:r>
-              <a:rPr lang="en-US" dirty="0" err="1"/>
-              <a:t>CCDData</a:t>
-            </a:r>
-            <a:r>
-              <a:rPr lang="en-US" dirty="0"/>
-              <a:t> class has methods for image arithmetic that propagate uncertainties, e.g.</a:t>
-            </a:r>
-          </a:p>
-          <a:p>
-            <a:pPr marL="457200" lvl="1" indent="0">
-              <a:buNone/>
-            </a:pPr>
-            <a:r>
-              <a:rPr lang="en-US" dirty="0"/>
-              <a:t>diff = </a:t>
-            </a:r>
-            <a:r>
-              <a:rPr lang="en-US" dirty="0" err="1"/>
-              <a:t>a.subtract</a:t>
-            </a:r>
-            <a:r>
-              <a:rPr lang="en-US" dirty="0"/>
-              <a:t>(b) </a:t>
-            </a:r>
           </a:p>
           <a:p>
             <a:r>

</xml_diff>